<commit_message>
Kleine Änderungen an den Tomatentrainingskarten.
Signed-off-by: Wolfgang Brandhuber <wolfgang.brandhuber@gmx.de>
</commit_message>
<xml_diff>
--- a/agile moves/Tomatoes (TOM)/ger/apprentice/ger_TOM_01_Aufdrehen_fertig_los_AM_A.pptx
+++ b/agile moves/Tomatoes (TOM)/ger/apprentice/ger_TOM_01_Aufdrehen_fertig_los_AM_A.pptx
@@ -108,6 +108,22 @@
       </a:defRPr>
     </a:lvl9pPr>
   </p:defaultTextStyle>
+  <p:extLst>
+    <p:ext uri="{EFAFB233-063F-42B5-8137-9DF3F51BA10A}">
+      <p15:sldGuideLst xmlns:p15="http://schemas.microsoft.com/office/powerpoint/2012/main">
+        <p15:guide id="1" orient="horz" pos="1103">
+          <p15:clr>
+            <a:srgbClr val="A4A3A4"/>
+          </p15:clr>
+        </p15:guide>
+        <p15:guide id="2" pos="772">
+          <p15:clr>
+            <a:srgbClr val="A4A3A4"/>
+          </p15:clr>
+        </p15:guide>
+      </p15:sldGuideLst>
+    </p:ext>
+  </p:extLst>
 </p:presentation>
 </file>
 
@@ -193,7 +209,7 @@
           <a:p>
             <a:fld id="{B0CB8B2F-27AE-FC42-9F9A-56AAD34EAFDA}" type="datetimeFigureOut">
               <a:rPr lang="de-DE" smtClean="0"/>
-              <a:t>14.08.15</a:t>
+              <a:t>15.08.2015</a:t>
             </a:fld>
             <a:endParaRPr lang="de-DE"/>
           </a:p>
@@ -1162,7 +1178,7 @@
           <a:p>
             <a:fld id="{FF5B2BAF-DF38-0A48-A798-0C06E514FD52}" type="datetimeFigureOut">
               <a:rPr lang="de-DE" smtClean="0"/>
-              <a:t>14.08.15</a:t>
+              <a:t>15.08.2015</a:t>
             </a:fld>
             <a:endParaRPr lang="de-DE" dirty="0"/>
           </a:p>
@@ -1432,7 +1448,7 @@
           <a:p>
             <a:fld id="{FF5B2BAF-DF38-0A48-A798-0C06E514FD52}" type="datetimeFigureOut">
               <a:rPr lang="de-DE" smtClean="0"/>
-              <a:t>14.08.15</a:t>
+              <a:t>15.08.2015</a:t>
             </a:fld>
             <a:endParaRPr lang="de-DE" dirty="0"/>
           </a:p>
@@ -2241,7 +2257,6 @@
               <a:rPr lang="de-DE" sz="1200" dirty="0"/>
               <a:t>Pausen zwischen den Tomaten helfen Dir die Konzentration und Motivation über eine längere Zeitspanne aufrecht zu erhalten.</a:t>
             </a:r>
-            <a:endParaRPr lang="de-DE" sz="1200" dirty="0"/>
           </a:p>
         </p:txBody>
       </p:sp>
@@ -2580,7 +2595,15 @@
             </a:r>
             <a:r>
               <a:rPr lang="de-DE" sz="1200" dirty="0"/>
-              <a:t>Wochen mindestens 12 </a:t>
+              <a:t>Wochen </a:t>
+            </a:r>
+            <a:r>
+              <a:rPr lang="de-DE" sz="1200"/>
+              <a:t>mindestens </a:t>
+            </a:r>
+            <a:r>
+              <a:rPr lang="de-DE" sz="1200" smtClean="0"/>
+              <a:t>zwölf </a:t>
             </a:r>
             <a:r>
               <a:rPr lang="de-DE" sz="1200" dirty="0" smtClean="0"/>
@@ -2616,7 +2639,6 @@
               <a:rPr lang="de-DE" sz="1200" dirty="0" smtClean="0"/>
               <a:t>.</a:t>
             </a:r>
-            <a:endParaRPr lang="de-DE" sz="1200" dirty="0" smtClean="0"/>
           </a:p>
           <a:p>
             <a:pPr>
@@ -2668,7 +2690,6 @@
               <a:rPr lang="de-DE" sz="1200" dirty="0"/>
               <a:t>Deine Erfahrungen und Ergebnisse.</a:t>
             </a:r>
-            <a:endParaRPr lang="de-DE" sz="1200" dirty="0"/>
           </a:p>
           <a:p>
             <a:pPr>

</xml_diff>